<commit_message>
Tweaked slides and disjunction material
</commit_message>
<xml_diff>
--- a/05_Functions/Functions.pptx
+++ b/05_Functions/Functions.pptx
@@ -5,7 +5,7 @@
     <p:sldMasterId id="2147483648" r:id="rId1"/>
   </p:sldMasterIdLst>
   <p:notesMasterIdLst>
-    <p:notesMasterId r:id="rId13"/>
+    <p:notesMasterId r:id="rId14"/>
   </p:notesMasterIdLst>
   <p:sldIdLst>
     <p:sldId id="258" r:id="rId2"/>
@@ -18,7 +18,8 @@
     <p:sldId id="331" r:id="rId9"/>
     <p:sldId id="333" r:id="rId10"/>
     <p:sldId id="332" r:id="rId11"/>
-    <p:sldId id="261" r:id="rId12"/>
+    <p:sldId id="334" r:id="rId12"/>
+    <p:sldId id="261" r:id="rId13"/>
   </p:sldIdLst>
   <p:sldSz cx="12192000" cy="6858000"/>
   <p:notesSz cx="6858000" cy="9144000"/>
@@ -3865,6 +3866,193 @@
 </file>
 
 <file path=ppt/slides/slide11.xml><?xml version="1.0" encoding="utf-8"?>
+<p:sld xmlns:a="http://schemas.openxmlformats.org/drawingml/2006/main" xmlns:r="http://schemas.openxmlformats.org/officeDocument/2006/relationships" xmlns:p="http://schemas.openxmlformats.org/presentationml/2006/main">
+  <p:cSld>
+    <p:spTree>
+      <p:nvGrpSpPr>
+        <p:cNvPr id="1" name=""/>
+        <p:cNvGrpSpPr/>
+        <p:nvPr/>
+      </p:nvGrpSpPr>
+      <p:grpSpPr>
+        <a:xfrm>
+          <a:off x="0" y="0"/>
+          <a:ext cx="0" cy="0"/>
+          <a:chOff x="0" y="0"/>
+          <a:chExt cx="0" cy="0"/>
+        </a:xfrm>
+      </p:grpSpPr>
+      <p:sp>
+        <p:nvSpPr>
+          <p:cNvPr id="2" name="Title 1">
+            <a:extLst>
+              <a:ext uri="{FF2B5EF4-FFF2-40B4-BE49-F238E27FC236}">
+                <a16:creationId xmlns:a16="http://schemas.microsoft.com/office/drawing/2014/main" id="{758DF433-D9C6-F044-8D78-654A114D4459}"/>
+              </a:ext>
+            </a:extLst>
+          </p:cNvPr>
+          <p:cNvSpPr>
+            <a:spLocks noGrp="1"/>
+          </p:cNvSpPr>
+          <p:nvPr>
+            <p:ph type="title"/>
+          </p:nvPr>
+        </p:nvSpPr>
+        <p:spPr/>
+        <p:txBody>
+          <a:bodyPr/>
+          <a:lstStyle/>
+          <a:p>
+            <a:r>
+              <a:rPr lang="en-US" dirty="0"/>
+              <a:t>Story time</a:t>
+            </a:r>
+          </a:p>
+        </p:txBody>
+      </p:sp>
+      <p:sp>
+        <p:nvSpPr>
+          <p:cNvPr id="3" name="Content Placeholder 2">
+            <a:extLst>
+              <a:ext uri="{FF2B5EF4-FFF2-40B4-BE49-F238E27FC236}">
+                <a16:creationId xmlns:a16="http://schemas.microsoft.com/office/drawing/2014/main" id="{47F40EBA-56C5-D049-BF28-E5E2F7CA9843}"/>
+              </a:ext>
+            </a:extLst>
+          </p:cNvPr>
+          <p:cNvSpPr>
+            <a:spLocks noGrp="1"/>
+          </p:cNvSpPr>
+          <p:nvPr>
+            <p:ph idx="1"/>
+          </p:nvPr>
+        </p:nvSpPr>
+        <p:spPr>
+          <a:xfrm>
+            <a:off x="838200" y="1825625"/>
+            <a:ext cx="7712034" cy="4351338"/>
+          </a:xfrm>
+        </p:spPr>
+        <p:txBody>
+          <a:bodyPr/>
+          <a:lstStyle/>
+          <a:p>
+            <a:r>
+              <a:rPr lang="en-US" dirty="0"/>
+              <a:t>It’s important to get your functions correct</a:t>
+            </a:r>
+          </a:p>
+          <a:p>
+            <a:r>
+              <a:rPr lang="en-US" dirty="0"/>
+              <a:t>Omitting an “overbar” from an equation in the Mariner 1 software (1962) caused the guidance system to interpret normal movement in the spacecraft as something that needed to be compensated for</a:t>
+            </a:r>
+          </a:p>
+          <a:p>
+            <a:r>
+              <a:rPr lang="en-US" dirty="0"/>
+              <a:t>Mariner 1 had to be destroyed 293 seconds into its mission</a:t>
+            </a:r>
+          </a:p>
+          <a:p>
+            <a:r>
+              <a:rPr lang="en-US" dirty="0"/>
+              <a:t>How could this have been prevented?</a:t>
+            </a:r>
+          </a:p>
+        </p:txBody>
+      </p:sp>
+      <p:pic>
+        <p:nvPicPr>
+          <p:cNvPr id="4" name="Picture 3">
+            <a:extLst>
+              <a:ext uri="{FF2B5EF4-FFF2-40B4-BE49-F238E27FC236}">
+                <a16:creationId xmlns:a16="http://schemas.microsoft.com/office/drawing/2014/main" id="{2EC62BC5-ADE0-484E-93D4-86738BD2A4E9}"/>
+              </a:ext>
+            </a:extLst>
+          </p:cNvPr>
+          <p:cNvPicPr>
+            <a:picLocks noChangeAspect="1"/>
+          </p:cNvPicPr>
+          <p:nvPr/>
+        </p:nvPicPr>
+        <p:blipFill>
+          <a:blip r:embed="rId2"/>
+          <a:stretch>
+            <a:fillRect/>
+          </a:stretch>
+        </p:blipFill>
+        <p:spPr>
+          <a:xfrm rot="5400000">
+            <a:off x="7228286" y="2148223"/>
+            <a:ext cx="5633264" cy="2617763"/>
+          </a:xfrm>
+          <a:prstGeom prst="rect">
+            <a:avLst/>
+          </a:prstGeom>
+        </p:spPr>
+      </p:pic>
+      <p:sp>
+        <p:nvSpPr>
+          <p:cNvPr id="5" name="TextBox 4">
+            <a:extLst>
+              <a:ext uri="{FF2B5EF4-FFF2-40B4-BE49-F238E27FC236}">
+                <a16:creationId xmlns:a16="http://schemas.microsoft.com/office/drawing/2014/main" id="{B1115F4B-1D26-8643-A00C-379C35F23DDC}"/>
+              </a:ext>
+            </a:extLst>
+          </p:cNvPr>
+          <p:cNvSpPr txBox="1"/>
+          <p:nvPr/>
+        </p:nvSpPr>
+        <p:spPr>
+          <a:xfrm>
+            <a:off x="4821884" y="6270174"/>
+            <a:ext cx="6531916" cy="276999"/>
+          </a:xfrm>
+          <a:prstGeom prst="rect">
+            <a:avLst/>
+          </a:prstGeom>
+          <a:noFill/>
+        </p:spPr>
+        <p:txBody>
+          <a:bodyPr wrap="none" rtlCol="0">
+            <a:spAutoFit/>
+          </a:bodyPr>
+          <a:lstStyle/>
+          <a:p>
+            <a:r>
+              <a:rPr lang="en-US" sz="1200" dirty="0"/>
+              <a:t>Image courtesy Wikimedia commons: https://</a:t>
+            </a:r>
+            <a:r>
+              <a:rPr lang="en-US" sz="1200" dirty="0" err="1"/>
+              <a:t>commons.wikimedia.org</a:t>
+            </a:r>
+            <a:r>
+              <a:rPr lang="en-US" sz="1200" dirty="0"/>
+              <a:t>/wiki/</a:t>
+            </a:r>
+            <a:r>
+              <a:rPr lang="en-US" sz="1200" dirty="0" err="1"/>
+              <a:t>File:Punch-card-cobol.jpg</a:t>
+            </a:r>
+            <a:endParaRPr lang="en-US" sz="1200" dirty="0"/>
+          </a:p>
+        </p:txBody>
+      </p:sp>
+    </p:spTree>
+    <p:extLst>
+      <p:ext uri="{BB962C8B-B14F-4D97-AF65-F5344CB8AC3E}">
+        <p14:creationId xmlns:p14="http://schemas.microsoft.com/office/powerpoint/2010/main" val="3245273233"/>
+      </p:ext>
+    </p:extLst>
+  </p:cSld>
+  <p:clrMapOvr>
+    <a:masterClrMapping/>
+  </p:clrMapOvr>
+</p:sld>
+</file>
+
+<file path=ppt/slides/slide12.xml><?xml version="1.0" encoding="utf-8"?>
 <p:sld xmlns:a="http://schemas.openxmlformats.org/drawingml/2006/main" xmlns:r="http://schemas.openxmlformats.org/officeDocument/2006/relationships" xmlns:p="http://schemas.openxmlformats.org/presentationml/2006/main">
   <p:cSld>
     <p:bg>
@@ -7575,7 +7763,7 @@
               <a:t>theorem </a:t>
             </a:r>
             <a:r>
-              <a:rPr lang="en-US" sz="2400">
+              <a:rPr lang="en-US" sz="2400" dirty="0" err="1">
                 <a:latin typeface="Courier New" panose="02070309020205020404" pitchFamily="49" charset="0"/>
                 <a:cs typeface="Courier New" panose="02070309020205020404" pitchFamily="49" charset="0"/>
               </a:rPr>

</xml_diff>